<commit_message>
Update UI class diagram in DG and add some writeup
</commit_message>
<xml_diff>
--- a/docs/diagrams/UiComponentClassDiagram.pptx
+++ b/docs/diagrams/UiComponentClassDiagram.pptx
@@ -208,7 +208,7 @@
           <a:p>
             <a:fld id="{F5CC4B3F-88C1-4FFA-B1B6-F41C21DC6924}" type="datetimeFigureOut">
               <a:rPr lang="en-US" smtClean="0"/>
-              <a:t>1/7/2017</a:t>
+              <a:t>11/11/18</a:t>
             </a:fld>
             <a:endParaRPr lang="en-US"/>
           </a:p>
@@ -654,7 +654,7 @@
           <a:p>
             <a:fld id="{78C97017-6FC3-485B-9764-EAC9E56C1D49}" type="datetimeFigureOut">
               <a:rPr lang="en-US" smtClean="0"/>
-              <a:t>1/7/2017</a:t>
+              <a:t>11/11/18</a:t>
             </a:fld>
             <a:endParaRPr lang="en-US"/>
           </a:p>
@@ -822,7 +822,7 @@
           <a:p>
             <a:fld id="{78C97017-6FC3-485B-9764-EAC9E56C1D49}" type="datetimeFigureOut">
               <a:rPr lang="en-US" smtClean="0"/>
-              <a:t>1/7/2017</a:t>
+              <a:t>11/11/18</a:t>
             </a:fld>
             <a:endParaRPr lang="en-US"/>
           </a:p>
@@ -1000,7 +1000,7 @@
           <a:p>
             <a:fld id="{78C97017-6FC3-485B-9764-EAC9E56C1D49}" type="datetimeFigureOut">
               <a:rPr lang="en-US" smtClean="0"/>
-              <a:t>1/7/2017</a:t>
+              <a:t>11/11/18</a:t>
             </a:fld>
             <a:endParaRPr lang="en-US"/>
           </a:p>
@@ -1168,7 +1168,7 @@
           <a:p>
             <a:fld id="{78C97017-6FC3-485B-9764-EAC9E56C1D49}" type="datetimeFigureOut">
               <a:rPr lang="en-US" smtClean="0"/>
-              <a:t>1/7/2017</a:t>
+              <a:t>11/11/18</a:t>
             </a:fld>
             <a:endParaRPr lang="en-US"/>
           </a:p>
@@ -1413,7 +1413,7 @@
           <a:p>
             <a:fld id="{78C97017-6FC3-485B-9764-EAC9E56C1D49}" type="datetimeFigureOut">
               <a:rPr lang="en-US" smtClean="0"/>
-              <a:t>1/7/2017</a:t>
+              <a:t>11/11/18</a:t>
             </a:fld>
             <a:endParaRPr lang="en-US"/>
           </a:p>
@@ -1698,7 +1698,7 @@
           <a:p>
             <a:fld id="{78C97017-6FC3-485B-9764-EAC9E56C1D49}" type="datetimeFigureOut">
               <a:rPr lang="en-US" smtClean="0"/>
-              <a:t>1/7/2017</a:t>
+              <a:t>11/11/18</a:t>
             </a:fld>
             <a:endParaRPr lang="en-US"/>
           </a:p>
@@ -2117,7 +2117,7 @@
           <a:p>
             <a:fld id="{78C97017-6FC3-485B-9764-EAC9E56C1D49}" type="datetimeFigureOut">
               <a:rPr lang="en-US" smtClean="0"/>
-              <a:t>1/7/2017</a:t>
+              <a:t>11/11/18</a:t>
             </a:fld>
             <a:endParaRPr lang="en-US"/>
           </a:p>
@@ -2234,7 +2234,7 @@
           <a:p>
             <a:fld id="{78C97017-6FC3-485B-9764-EAC9E56C1D49}" type="datetimeFigureOut">
               <a:rPr lang="en-US" smtClean="0"/>
-              <a:t>1/7/2017</a:t>
+              <a:t>11/11/18</a:t>
             </a:fld>
             <a:endParaRPr lang="en-US"/>
           </a:p>
@@ -2329,7 +2329,7 @@
           <a:p>
             <a:fld id="{78C97017-6FC3-485B-9764-EAC9E56C1D49}" type="datetimeFigureOut">
               <a:rPr lang="en-US" smtClean="0"/>
-              <a:t>1/7/2017</a:t>
+              <a:t>11/11/18</a:t>
             </a:fld>
             <a:endParaRPr lang="en-US"/>
           </a:p>
@@ -2604,7 +2604,7 @@
           <a:p>
             <a:fld id="{78C97017-6FC3-485B-9764-EAC9E56C1D49}" type="datetimeFigureOut">
               <a:rPr lang="en-US" smtClean="0"/>
-              <a:t>1/7/2017</a:t>
+              <a:t>11/11/18</a:t>
             </a:fld>
             <a:endParaRPr lang="en-US"/>
           </a:p>
@@ -2856,7 +2856,7 @@
           <a:p>
             <a:fld id="{78C97017-6FC3-485B-9764-EAC9E56C1D49}" type="datetimeFigureOut">
               <a:rPr lang="en-US" smtClean="0"/>
-              <a:t>1/7/2017</a:t>
+              <a:t>11/11/18</a:t>
             </a:fld>
             <a:endParaRPr lang="en-US"/>
           </a:p>
@@ -3067,7 +3067,7 @@
           <a:p>
             <a:fld id="{78C97017-6FC3-485B-9764-EAC9E56C1D49}" type="datetimeFigureOut">
               <a:rPr lang="en-US" smtClean="0"/>
-              <a:t>1/7/2017</a:t>
+              <a:t>11/11/18</a:t>
             </a:fld>
             <a:endParaRPr lang="en-US"/>
           </a:p>
@@ -3450,8 +3450,8 @@
         </p:nvSpPr>
         <p:spPr>
           <a:xfrm>
-            <a:off x="1217465" y="1447800"/>
-            <a:ext cx="4917083" cy="3962400"/>
+            <a:off x="1216694" y="271747"/>
+            <a:ext cx="4917083" cy="6052854"/>
           </a:xfrm>
           <a:prstGeom prst="roundRect">
             <a:avLst>
@@ -3512,7 +3512,7 @@
         </p:nvSpPr>
         <p:spPr>
           <a:xfrm>
-            <a:off x="2095948" y="2341220"/>
+            <a:off x="2097683" y="1045821"/>
             <a:ext cx="1093635" cy="346760"/>
           </a:xfrm>
           <a:prstGeom prst="rect">
@@ -3572,7 +3572,7 @@
         </p:nvSpPr>
         <p:spPr>
           <a:xfrm>
-            <a:off x="2592528" y="2971800"/>
+            <a:off x="2594263" y="1676401"/>
             <a:ext cx="1093635" cy="236841"/>
           </a:xfrm>
           <a:prstGeom prst="rect">
@@ -3632,7 +3632,7 @@
         </p:nvSpPr>
         <p:spPr>
           <a:xfrm>
-            <a:off x="2092842" y="1770924"/>
+            <a:off x="2094577" y="475525"/>
             <a:ext cx="1093635" cy="346760"/>
           </a:xfrm>
           <a:prstGeom prst="rect">
@@ -3694,7 +3694,7 @@
         </p:nvCxnSpPr>
         <p:spPr>
           <a:xfrm rot="16200000" flipH="1">
-            <a:off x="2529445" y="2227899"/>
+            <a:off x="2531180" y="932500"/>
             <a:ext cx="223536" cy="3106"/>
           </a:xfrm>
           <a:prstGeom prst="bentConnector3">
@@ -3734,7 +3734,7 @@
         </p:nvSpPr>
         <p:spPr>
           <a:xfrm rot="10800000" flipV="1">
-            <a:off x="5394717" y="2110477"/>
+            <a:off x="5396452" y="815078"/>
             <a:ext cx="270504" cy="175523"/>
           </a:xfrm>
           <a:prstGeom prst="triangle">
@@ -3782,7 +3782,7 @@
         </p:nvCxnSpPr>
         <p:spPr>
           <a:xfrm flipV="1">
-            <a:off x="644735" y="2991937"/>
+            <a:off x="646470" y="1696538"/>
             <a:ext cx="684904" cy="1"/>
           </a:xfrm>
           <a:prstGeom prst="bentConnector3">
@@ -3825,7 +3825,7 @@
         </p:nvSpPr>
         <p:spPr>
           <a:xfrm rot="16200000">
-            <a:off x="5703829" y="2464877"/>
+            <a:off x="5705564" y="1169478"/>
             <a:ext cx="2362201" cy="328045"/>
           </a:xfrm>
           <a:prstGeom prst="roundRect">
@@ -3885,7 +3885,7 @@
         </p:nvSpPr>
         <p:spPr>
           <a:xfrm>
-            <a:off x="2592528" y="3649359"/>
+            <a:off x="2594263" y="2353960"/>
             <a:ext cx="1093635" cy="236841"/>
           </a:xfrm>
           <a:prstGeom prst="rect">
@@ -3925,7 +3925,7 @@
                   </a:schemeClr>
                 </a:solidFill>
               </a:rPr>
-              <a:t>BrowserPanel</a:t>
+              <a:t>TaskDetailsPane</a:t>
             </a:r>
             <a:endParaRPr lang="en-SG" sz="1050" b="1" dirty="0">
               <a:solidFill>
@@ -3945,7 +3945,7 @@
         </p:nvSpPr>
         <p:spPr>
           <a:xfrm>
-            <a:off x="2592527" y="4563759"/>
+            <a:off x="2594262" y="3268360"/>
             <a:ext cx="1093635" cy="236841"/>
           </a:xfrm>
           <a:prstGeom prst="rect">
@@ -4005,7 +4005,7 @@
         </p:nvSpPr>
         <p:spPr>
           <a:xfrm>
-            <a:off x="2592526" y="3991960"/>
+            <a:off x="2594261" y="2696561"/>
             <a:ext cx="1093635" cy="236841"/>
           </a:xfrm>
           <a:prstGeom prst="rect">
@@ -4065,8 +4065,8 @@
         </p:nvSpPr>
         <p:spPr>
           <a:xfrm>
-            <a:off x="3839323" y="4228801"/>
-            <a:ext cx="1040906" cy="236841"/>
+            <a:off x="3841057" y="2933402"/>
+            <a:ext cx="1458015" cy="236841"/>
           </a:xfrm>
           <a:prstGeom prst="rect">
             <a:avLst/>
@@ -4125,7 +4125,7 @@
         </p:nvSpPr>
         <p:spPr>
           <a:xfrm>
-            <a:off x="2592528" y="4966000"/>
+            <a:off x="2590389" y="5972094"/>
             <a:ext cx="1093635" cy="236841"/>
           </a:xfrm>
           <a:prstGeom prst="rect">
@@ -4185,7 +4185,7 @@
         </p:nvSpPr>
         <p:spPr>
           <a:xfrm>
-            <a:off x="2324548" y="2706452"/>
+            <a:off x="2326283" y="1411053"/>
             <a:ext cx="183156" cy="161573"/>
           </a:xfrm>
           <a:prstGeom prst="flowChartDecision">
@@ -4236,7 +4236,7 @@
         </p:nvCxnSpPr>
         <p:spPr>
           <a:xfrm rot="16200000" flipH="1">
-            <a:off x="2393229" y="2890922"/>
+            <a:off x="2394964" y="1595523"/>
             <a:ext cx="222196" cy="176402"/>
           </a:xfrm>
           <a:prstGeom prst="bentConnector2">
@@ -4274,7 +4274,7 @@
         </p:nvSpPr>
         <p:spPr>
           <a:xfrm>
-            <a:off x="2590799" y="3304308"/>
+            <a:off x="2592534" y="2008909"/>
             <a:ext cx="1095361" cy="236841"/>
           </a:xfrm>
           <a:prstGeom prst="rect">
@@ -4337,7 +4337,7 @@
         </p:nvCxnSpPr>
         <p:spPr>
           <a:xfrm rot="16200000" flipH="1">
-            <a:off x="2054450" y="3229701"/>
+            <a:off x="2056185" y="1934302"/>
             <a:ext cx="899755" cy="176402"/>
           </a:xfrm>
           <a:prstGeom prst="bentConnector2">
@@ -4378,7 +4378,7 @@
         </p:nvCxnSpPr>
         <p:spPr>
           <a:xfrm rot="16200000" flipH="1">
-            <a:off x="1883148" y="3401003"/>
+            <a:off x="1884883" y="2105604"/>
             <a:ext cx="1242356" cy="176400"/>
           </a:xfrm>
           <a:prstGeom prst="bentConnector2">
@@ -4419,7 +4419,7 @@
         </p:nvCxnSpPr>
         <p:spPr>
           <a:xfrm rot="16200000" flipH="1">
-            <a:off x="1597249" y="3686901"/>
+            <a:off x="1598984" y="2391502"/>
             <a:ext cx="1814155" cy="176401"/>
           </a:xfrm>
           <a:prstGeom prst="bentConnector2">
@@ -4453,14 +4453,15 @@
         <p:nvCxnSpPr>
           <p:cNvPr id="53" name="Elbow Connector 63"/>
           <p:cNvCxnSpPr>
+            <a:cxnSpLocks/>
             <a:endCxn id="38" idx="1"/>
           </p:cNvCxnSpPr>
           <p:nvPr/>
         </p:nvCxnSpPr>
         <p:spPr>
           <a:xfrm rot="16200000" flipH="1">
-            <a:off x="1184119" y="3676012"/>
-            <a:ext cx="2396440" cy="420377"/>
+            <a:off x="25787" y="3525913"/>
+            <a:ext cx="4697934" cy="431270"/>
           </a:xfrm>
           <a:prstGeom prst="bentConnector2">
             <a:avLst/>
@@ -4497,7 +4498,7 @@
         </p:nvSpPr>
         <p:spPr>
           <a:xfrm>
-            <a:off x="5143948" y="1770924"/>
+            <a:off x="5145683" y="475525"/>
             <a:ext cx="772043" cy="346760"/>
           </a:xfrm>
           <a:prstGeom prst="rect">
@@ -4579,7 +4580,7 @@
         </p:nvCxnSpPr>
         <p:spPr>
           <a:xfrm flipV="1">
-            <a:off x="3686160" y="2286000"/>
+            <a:off x="3687895" y="990601"/>
             <a:ext cx="1843809" cy="1136729"/>
           </a:xfrm>
           <a:prstGeom prst="bentConnector2">
@@ -4613,6 +4614,7 @@
         <p:nvCxnSpPr>
           <p:cNvPr id="77" name="Elbow Connector 63"/>
           <p:cNvCxnSpPr>
+            <a:cxnSpLocks/>
             <a:stCxn id="16" idx="3"/>
             <a:endCxn id="37" idx="3"/>
           </p:cNvCxnSpPr>
@@ -4620,8 +4622,8 @@
         </p:nvCxnSpPr>
         <p:spPr>
           <a:xfrm rot="5400000">
-            <a:off x="4174488" y="2991741"/>
-            <a:ext cx="2061222" cy="649740"/>
+            <a:off x="4384777" y="1904896"/>
+            <a:ext cx="2061222" cy="232632"/>
           </a:xfrm>
           <a:prstGeom prst="bentConnector2">
             <a:avLst/>
@@ -4661,7 +4663,7 @@
         </p:nvCxnSpPr>
         <p:spPr>
           <a:xfrm rot="5400000">
-            <a:off x="3867176" y="2104987"/>
+            <a:off x="3868911" y="809588"/>
             <a:ext cx="1481780" cy="1843806"/>
           </a:xfrm>
           <a:prstGeom prst="bentConnector2">
@@ -4702,7 +4704,7 @@
         </p:nvCxnSpPr>
         <p:spPr>
           <a:xfrm flipV="1">
-            <a:off x="3189583" y="2286000"/>
+            <a:off x="3191318" y="990601"/>
             <a:ext cx="2340386" cy="228600"/>
           </a:xfrm>
           <a:prstGeom prst="bentConnector2">
@@ -4743,7 +4745,7 @@
         </p:nvCxnSpPr>
         <p:spPr>
           <a:xfrm rot="5400000">
-            <a:off x="3409976" y="2562187"/>
+            <a:off x="3411711" y="1266788"/>
             <a:ext cx="2396180" cy="1843807"/>
           </a:xfrm>
           <a:prstGeom prst="bentConnector2">
@@ -4777,15 +4779,15 @@
         <p:nvCxnSpPr>
           <p:cNvPr id="94" name="Elbow Connector 63"/>
           <p:cNvCxnSpPr>
-            <a:stCxn id="16" idx="3"/>
+            <a:cxnSpLocks/>
             <a:endCxn id="38" idx="3"/>
           </p:cNvCxnSpPr>
           <p:nvPr/>
         </p:nvCxnSpPr>
         <p:spPr>
           <a:xfrm rot="5400000">
-            <a:off x="3208856" y="2763307"/>
-            <a:ext cx="2798421" cy="1843806"/>
+            <a:off x="2729040" y="3291723"/>
+            <a:ext cx="3753777" cy="1843807"/>
           </a:xfrm>
           <a:prstGeom prst="bentConnector2">
             <a:avLst/>
@@ -4824,7 +4826,7 @@
         </p:nvCxnSpPr>
         <p:spPr>
           <a:xfrm rot="5400000" flipH="1" flipV="1">
-            <a:off x="4594921" y="-355061"/>
+            <a:off x="4596656" y="-1650460"/>
             <a:ext cx="170724" cy="4081246"/>
           </a:xfrm>
           <a:prstGeom prst="bentConnector2">
@@ -4863,8 +4865,8 @@
         </p:nvSpPr>
         <p:spPr>
           <a:xfrm rot="16200000">
-            <a:off x="6213739" y="4560376"/>
-            <a:ext cx="1371599" cy="328045"/>
+            <a:off x="5491573" y="3988876"/>
+            <a:ext cx="2819401" cy="328045"/>
           </a:xfrm>
           <a:prstGeom prst="roundRect">
             <a:avLst/>
@@ -4923,7 +4925,7 @@
         </p:nvSpPr>
         <p:spPr>
           <a:xfrm rot="16200000">
-            <a:off x="956202" y="2861202"/>
+            <a:off x="957937" y="1565803"/>
             <a:ext cx="1093635" cy="346760"/>
           </a:xfrm>
           <a:prstGeom prst="rect">
@@ -4993,7 +4995,7 @@
         </p:nvSpPr>
         <p:spPr>
           <a:xfrm flipV="1">
-            <a:off x="1367767" y="2286001"/>
+            <a:off x="1369502" y="990602"/>
             <a:ext cx="270504" cy="175523"/>
           </a:xfrm>
           <a:prstGeom prst="triangle">
@@ -5044,7 +5046,7 @@
         </p:nvCxnSpPr>
         <p:spPr>
           <a:xfrm rot="10800000" flipV="1">
-            <a:off x="1503020" y="1944303"/>
+            <a:off x="1504755" y="648904"/>
             <a:ext cx="589823" cy="341697"/>
           </a:xfrm>
           <a:prstGeom prst="bentConnector2">
@@ -5086,7 +5088,7 @@
         </p:nvCxnSpPr>
         <p:spPr>
           <a:xfrm rot="16200000" flipH="1">
-            <a:off x="2226110" y="3058040"/>
+            <a:off x="2227845" y="1762641"/>
             <a:ext cx="554704" cy="174673"/>
           </a:xfrm>
           <a:prstGeom prst="bentConnector2">
@@ -5127,7 +5129,7 @@
         </p:nvCxnSpPr>
         <p:spPr>
           <a:xfrm rot="5400000">
-            <a:off x="4205956" y="1766207"/>
+            <a:off x="4207691" y="470808"/>
             <a:ext cx="804221" cy="1843806"/>
           </a:xfrm>
           <a:prstGeom prst="bentConnector2">
@@ -5161,6 +5163,7 @@
         <p:nvCxnSpPr>
           <p:cNvPr id="137" name="Elbow Connector 136"/>
           <p:cNvCxnSpPr>
+            <a:cxnSpLocks/>
             <a:stCxn id="36" idx="2"/>
             <a:endCxn id="37" idx="1"/>
           </p:cNvCxnSpPr>
@@ -5168,8 +5171,8 @@
         </p:nvCxnSpPr>
         <p:spPr>
           <a:xfrm rot="16200000" flipH="1">
-            <a:off x="3430123" y="3938021"/>
-            <a:ext cx="118421" cy="699979"/>
+            <a:off x="3431858" y="2642623"/>
+            <a:ext cx="118421" cy="699978"/>
           </a:xfrm>
           <a:prstGeom prst="bentConnector2">
             <a:avLst/>
@@ -5209,7 +5212,7 @@
         </p:nvCxnSpPr>
         <p:spPr>
           <a:xfrm rot="5400000">
-            <a:off x="3695875" y="2276286"/>
+            <a:off x="3697610" y="980887"/>
             <a:ext cx="1824381" cy="1843808"/>
           </a:xfrm>
           <a:prstGeom prst="bentConnector2">
@@ -5247,7 +5250,7 @@
         </p:nvSpPr>
         <p:spPr>
           <a:xfrm>
-            <a:off x="5435896" y="2743200"/>
+            <a:off x="5437631" y="1447801"/>
             <a:ext cx="229325" cy="166560"/>
           </a:xfrm>
           <a:prstGeom prst="rect">
@@ -5300,7 +5303,7 @@
         </p:nvSpPr>
         <p:spPr>
           <a:xfrm>
-            <a:off x="3687515" y="2828802"/>
+            <a:off x="3689250" y="1533403"/>
             <a:ext cx="3048000" cy="203200"/>
           </a:xfrm>
           <a:custGeom>
@@ -5382,7 +5385,7 @@
         </p:nvSpPr>
         <p:spPr>
           <a:xfrm>
-            <a:off x="5431573" y="4488138"/>
+            <a:off x="5433308" y="3192739"/>
             <a:ext cx="229325" cy="160062"/>
           </a:xfrm>
           <a:prstGeom prst="rect">
@@ -5435,7 +5438,7 @@
         </p:nvSpPr>
         <p:spPr>
           <a:xfrm flipV="1">
-            <a:off x="4114799" y="4472708"/>
+            <a:off x="4116534" y="3177309"/>
             <a:ext cx="2642195" cy="101600"/>
           </a:xfrm>
           <a:custGeom>
@@ -5509,6 +5512,1091 @@
           </a:p>
         </p:txBody>
       </p:sp>
+      <p:sp>
+        <p:nvSpPr>
+          <p:cNvPr id="49" name="Rectangle 11">
+            <a:extLst>
+              <a:ext uri="{FF2B5EF4-FFF2-40B4-BE49-F238E27FC236}">
+                <a16:creationId xmlns:a16="http://schemas.microsoft.com/office/drawing/2014/main" id="{FCFF0650-B879-A449-BB52-ACBF6C4C8B88}"/>
+              </a:ext>
+            </a:extLst>
+          </p:cNvPr>
+          <p:cNvSpPr/>
+          <p:nvPr/>
+        </p:nvSpPr>
+        <p:spPr>
+          <a:xfrm>
+            <a:off x="2595063" y="3635355"/>
+            <a:ext cx="1093635" cy="236841"/>
+          </a:xfrm>
+          <a:prstGeom prst="rect">
+            <a:avLst/>
+          </a:prstGeom>
+          <a:ln w="19050">
+            <a:solidFill>
+              <a:schemeClr val="accent3"/>
+            </a:solidFill>
+          </a:ln>
+          <a:effectLst/>
+        </p:spPr>
+        <p:style>
+          <a:lnRef idx="1">
+            <a:schemeClr val="accent3"/>
+          </a:lnRef>
+          <a:fillRef idx="2">
+            <a:schemeClr val="accent3"/>
+          </a:fillRef>
+          <a:effectRef idx="1">
+            <a:schemeClr val="accent3"/>
+          </a:effectRef>
+          <a:fontRef idx="minor">
+            <a:schemeClr val="dk1"/>
+          </a:fontRef>
+        </p:style>
+        <p:txBody>
+          <a:bodyPr rtlCol="0" anchor="ctr"/>
+          <a:lstStyle/>
+          <a:p>
+            <a:pPr algn="ctr"/>
+            <a:r>
+              <a:rPr lang="en-US" sz="1050" b="1" dirty="0" err="1">
+                <a:solidFill>
+                  <a:schemeClr val="accent3">
+                    <a:lumMod val="75000"/>
+                  </a:schemeClr>
+                </a:solidFill>
+              </a:rPr>
+              <a:t>CalendarPanel</a:t>
+            </a:r>
+            <a:endParaRPr lang="en-SG" sz="1050" b="1" dirty="0">
+              <a:solidFill>
+                <a:schemeClr val="accent3">
+                  <a:lumMod val="75000"/>
+                </a:schemeClr>
+              </a:solidFill>
+            </a:endParaRPr>
+          </a:p>
+        </p:txBody>
+      </p:sp>
+      <p:sp>
+        <p:nvSpPr>
+          <p:cNvPr id="51" name="Rectangle 11">
+            <a:extLst>
+              <a:ext uri="{FF2B5EF4-FFF2-40B4-BE49-F238E27FC236}">
+                <a16:creationId xmlns:a16="http://schemas.microsoft.com/office/drawing/2014/main" id="{9FF38F50-8752-3F45-9E0F-D2988D8435C1}"/>
+              </a:ext>
+            </a:extLst>
+          </p:cNvPr>
+          <p:cNvSpPr/>
+          <p:nvPr/>
+        </p:nvSpPr>
+        <p:spPr>
+          <a:xfrm>
+            <a:off x="3841859" y="3872196"/>
+            <a:ext cx="1464555" cy="236841"/>
+          </a:xfrm>
+          <a:prstGeom prst="rect">
+            <a:avLst/>
+          </a:prstGeom>
+          <a:ln w="19050">
+            <a:solidFill>
+              <a:schemeClr val="accent3"/>
+            </a:solidFill>
+          </a:ln>
+          <a:effectLst/>
+        </p:spPr>
+        <p:style>
+          <a:lnRef idx="1">
+            <a:schemeClr val="accent3"/>
+          </a:lnRef>
+          <a:fillRef idx="2">
+            <a:schemeClr val="accent3"/>
+          </a:fillRef>
+          <a:effectRef idx="1">
+            <a:schemeClr val="accent3"/>
+          </a:effectRef>
+          <a:fontRef idx="minor">
+            <a:schemeClr val="dk1"/>
+          </a:fontRef>
+        </p:style>
+        <p:txBody>
+          <a:bodyPr rtlCol="0" anchor="ctr"/>
+          <a:lstStyle/>
+          <a:p>
+            <a:pPr algn="ctr"/>
+            <a:r>
+              <a:rPr lang="en-US" sz="1050" b="1" dirty="0" err="1">
+                <a:solidFill>
+                  <a:schemeClr val="accent3">
+                    <a:lumMod val="75000"/>
+                  </a:schemeClr>
+                </a:solidFill>
+              </a:rPr>
+              <a:t>CalendarTaskCard</a:t>
+            </a:r>
+            <a:endParaRPr lang="en-SG" sz="1050" b="1" dirty="0">
+              <a:solidFill>
+                <a:schemeClr val="accent3">
+                  <a:lumMod val="75000"/>
+                </a:schemeClr>
+              </a:solidFill>
+            </a:endParaRPr>
+          </a:p>
+        </p:txBody>
+      </p:sp>
+      <p:cxnSp>
+        <p:nvCxnSpPr>
+          <p:cNvPr id="52" name="Elbow Connector 63">
+            <a:extLst>
+              <a:ext uri="{FF2B5EF4-FFF2-40B4-BE49-F238E27FC236}">
+                <a16:creationId xmlns:a16="http://schemas.microsoft.com/office/drawing/2014/main" id="{4553070D-9519-FC45-AAC4-54553CDBB1F4}"/>
+              </a:ext>
+            </a:extLst>
+          </p:cNvPr>
+          <p:cNvCxnSpPr>
+            <a:endCxn id="49" idx="1"/>
+          </p:cNvCxnSpPr>
+          <p:nvPr/>
+        </p:nvCxnSpPr>
+        <p:spPr>
+          <a:xfrm rot="16200000" flipH="1">
+            <a:off x="1885685" y="3044398"/>
+            <a:ext cx="1242356" cy="176400"/>
+          </a:xfrm>
+          <a:prstGeom prst="bentConnector2">
+            <a:avLst/>
+          </a:prstGeom>
+          <a:ln w="19050">
+            <a:solidFill>
+              <a:schemeClr val="accent3"/>
+            </a:solidFill>
+            <a:headEnd type="none" w="med" len="med"/>
+            <a:tailEnd type="arrow" w="med" len="med"/>
+          </a:ln>
+          <a:effectLst/>
+        </p:spPr>
+        <p:style>
+          <a:lnRef idx="1">
+            <a:schemeClr val="accent2"/>
+          </a:lnRef>
+          <a:fillRef idx="2">
+            <a:schemeClr val="accent2"/>
+          </a:fillRef>
+          <a:effectRef idx="1">
+            <a:schemeClr val="accent2"/>
+          </a:effectRef>
+          <a:fontRef idx="minor">
+            <a:schemeClr val="dk1"/>
+          </a:fontRef>
+        </p:style>
+      </p:cxnSp>
+      <p:cxnSp>
+        <p:nvCxnSpPr>
+          <p:cNvPr id="54" name="Elbow Connector 63">
+            <a:extLst>
+              <a:ext uri="{FF2B5EF4-FFF2-40B4-BE49-F238E27FC236}">
+                <a16:creationId xmlns:a16="http://schemas.microsoft.com/office/drawing/2014/main" id="{1FDE5042-9434-1145-B2F3-E16B4F5D3FEC}"/>
+              </a:ext>
+            </a:extLst>
+          </p:cNvPr>
+          <p:cNvCxnSpPr>
+            <a:cxnSpLocks/>
+            <a:endCxn id="51" idx="3"/>
+          </p:cNvCxnSpPr>
+          <p:nvPr/>
+        </p:nvCxnSpPr>
+        <p:spPr>
+          <a:xfrm rot="5400000">
+            <a:off x="4388849" y="2846960"/>
+            <a:ext cx="2061222" cy="226092"/>
+          </a:xfrm>
+          <a:prstGeom prst="bentConnector2">
+            <a:avLst/>
+          </a:prstGeom>
+          <a:ln w="6350">
+            <a:solidFill>
+              <a:schemeClr val="accent3"/>
+            </a:solidFill>
+            <a:headEnd type="none" w="med" len="med"/>
+            <a:tailEnd type="none" w="med" len="med"/>
+          </a:ln>
+          <a:effectLst/>
+        </p:spPr>
+        <p:style>
+          <a:lnRef idx="1">
+            <a:schemeClr val="accent2"/>
+          </a:lnRef>
+          <a:fillRef idx="2">
+            <a:schemeClr val="accent2"/>
+          </a:fillRef>
+          <a:effectRef idx="1">
+            <a:schemeClr val="accent2"/>
+          </a:effectRef>
+          <a:fontRef idx="minor">
+            <a:schemeClr val="dk1"/>
+          </a:fontRef>
+        </p:style>
+      </p:cxnSp>
+      <p:cxnSp>
+        <p:nvCxnSpPr>
+          <p:cNvPr id="55" name="Elbow Connector 54">
+            <a:extLst>
+              <a:ext uri="{FF2B5EF4-FFF2-40B4-BE49-F238E27FC236}">
+                <a16:creationId xmlns:a16="http://schemas.microsoft.com/office/drawing/2014/main" id="{9850676D-A800-0B4E-AF10-5F973B20E71B}"/>
+              </a:ext>
+            </a:extLst>
+          </p:cNvPr>
+          <p:cNvCxnSpPr>
+            <a:cxnSpLocks/>
+            <a:stCxn id="49" idx="2"/>
+            <a:endCxn id="51" idx="1"/>
+          </p:cNvCxnSpPr>
+          <p:nvPr/>
+        </p:nvCxnSpPr>
+        <p:spPr>
+          <a:xfrm rot="16200000" flipH="1">
+            <a:off x="3432660" y="3581417"/>
+            <a:ext cx="118421" cy="699978"/>
+          </a:xfrm>
+          <a:prstGeom prst="bentConnector2">
+            <a:avLst/>
+          </a:prstGeom>
+          <a:ln w="19050">
+            <a:solidFill>
+              <a:schemeClr val="accent3"/>
+            </a:solidFill>
+            <a:headEnd type="none" w="med" len="med"/>
+            <a:tailEnd type="arrow" w="med" len="med"/>
+          </a:ln>
+          <a:effectLst/>
+        </p:spPr>
+        <p:style>
+          <a:lnRef idx="1">
+            <a:schemeClr val="accent2"/>
+          </a:lnRef>
+          <a:fillRef idx="2">
+            <a:schemeClr val="accent2"/>
+          </a:fillRef>
+          <a:effectRef idx="1">
+            <a:schemeClr val="accent2"/>
+          </a:effectRef>
+          <a:fontRef idx="minor">
+            <a:schemeClr val="dk1"/>
+          </a:fontRef>
+        </p:style>
+      </p:cxnSp>
+      <p:sp>
+        <p:nvSpPr>
+          <p:cNvPr id="56" name="Freeform 55">
+            <a:extLst>
+              <a:ext uri="{FF2B5EF4-FFF2-40B4-BE49-F238E27FC236}">
+                <a16:creationId xmlns:a16="http://schemas.microsoft.com/office/drawing/2014/main" id="{E2BEF637-8DCC-6C43-AC73-ACBA63C8B578}"/>
+              </a:ext>
+            </a:extLst>
+          </p:cNvPr>
+          <p:cNvSpPr/>
+          <p:nvPr/>
+        </p:nvSpPr>
+        <p:spPr>
+          <a:xfrm flipV="1">
+            <a:off x="4117336" y="4116103"/>
+            <a:ext cx="2642195" cy="101600"/>
+          </a:xfrm>
+          <a:custGeom>
+            <a:avLst/>
+            <a:gdLst>
+              <a:gd name="connsiteX0" fmla="*/ 0 w 3048000"/>
+              <a:gd name="connsiteY0" fmla="*/ 203200 h 203200"/>
+              <a:gd name="connsiteX1" fmla="*/ 221673 w 3048000"/>
+              <a:gd name="connsiteY1" fmla="*/ 0 h 203200"/>
+              <a:gd name="connsiteX2" fmla="*/ 3048000 w 3048000"/>
+              <a:gd name="connsiteY2" fmla="*/ 0 h 203200"/>
+            </a:gdLst>
+            <a:ahLst/>
+            <a:cxnLst>
+              <a:cxn ang="0">
+                <a:pos x="connsiteX0" y="connsiteY0"/>
+              </a:cxn>
+              <a:cxn ang="0">
+                <a:pos x="connsiteX1" y="connsiteY1"/>
+              </a:cxn>
+              <a:cxn ang="0">
+                <a:pos x="connsiteX2" y="connsiteY2"/>
+              </a:cxn>
+            </a:cxnLst>
+            <a:rect l="l" t="t" r="r" b="b"/>
+            <a:pathLst>
+              <a:path w="3048000" h="203200">
+                <a:moveTo>
+                  <a:pt x="0" y="203200"/>
+                </a:moveTo>
+                <a:lnTo>
+                  <a:pt x="221673" y="0"/>
+                </a:lnTo>
+                <a:lnTo>
+                  <a:pt x="3048000" y="0"/>
+                </a:lnTo>
+              </a:path>
+            </a:pathLst>
+          </a:custGeom>
+          <a:noFill/>
+          <a:ln w="19050">
+            <a:solidFill>
+              <a:schemeClr val="accent3"/>
+            </a:solidFill>
+            <a:prstDash val="sysDot"/>
+            <a:headEnd type="none" w="med" len="med"/>
+            <a:tailEnd type="arrow" w="med" len="med"/>
+          </a:ln>
+          <a:effectLst/>
+        </p:spPr>
+        <p:style>
+          <a:lnRef idx="1">
+            <a:schemeClr val="accent2"/>
+          </a:lnRef>
+          <a:fillRef idx="2">
+            <a:schemeClr val="accent2"/>
+          </a:fillRef>
+          <a:effectRef idx="1">
+            <a:schemeClr val="accent2"/>
+          </a:effectRef>
+          <a:fontRef idx="minor">
+            <a:schemeClr val="dk1"/>
+          </a:fontRef>
+        </p:style>
+        <p:txBody>
+          <a:bodyPr rtlCol="0" anchor="ctr"/>
+          <a:lstStyle/>
+          <a:p>
+            <a:pPr algn="ctr"/>
+            <a:endParaRPr lang="en-SG"/>
+          </a:p>
+        </p:txBody>
+      </p:sp>
+      <p:sp>
+        <p:nvSpPr>
+          <p:cNvPr id="57" name="Rectangle 11">
+            <a:extLst>
+              <a:ext uri="{FF2B5EF4-FFF2-40B4-BE49-F238E27FC236}">
+                <a16:creationId xmlns:a16="http://schemas.microsoft.com/office/drawing/2014/main" id="{EA67EE5A-95B2-F74C-80A0-EB4387B7B960}"/>
+              </a:ext>
+            </a:extLst>
+          </p:cNvPr>
+          <p:cNvSpPr/>
+          <p:nvPr/>
+        </p:nvSpPr>
+        <p:spPr>
+          <a:xfrm>
+            <a:off x="3841057" y="4279789"/>
+            <a:ext cx="1464555" cy="236841"/>
+          </a:xfrm>
+          <a:prstGeom prst="rect">
+            <a:avLst/>
+          </a:prstGeom>
+          <a:ln w="19050">
+            <a:solidFill>
+              <a:schemeClr val="accent3"/>
+            </a:solidFill>
+          </a:ln>
+          <a:effectLst/>
+        </p:spPr>
+        <p:style>
+          <a:lnRef idx="1">
+            <a:schemeClr val="accent3"/>
+          </a:lnRef>
+          <a:fillRef idx="2">
+            <a:schemeClr val="accent3"/>
+          </a:fillRef>
+          <a:effectRef idx="1">
+            <a:schemeClr val="accent3"/>
+          </a:effectRef>
+          <a:fontRef idx="minor">
+            <a:schemeClr val="dk1"/>
+          </a:fontRef>
+        </p:style>
+        <p:txBody>
+          <a:bodyPr rtlCol="0" anchor="ctr"/>
+          <a:lstStyle/>
+          <a:p>
+            <a:pPr algn="ctr"/>
+            <a:r>
+              <a:rPr lang="en-US" sz="1050" b="1" dirty="0" err="1">
+                <a:solidFill>
+                  <a:schemeClr val="accent3">
+                    <a:lumMod val="75000"/>
+                  </a:schemeClr>
+                </a:solidFill>
+              </a:rPr>
+              <a:t>CalendarHeaderCell</a:t>
+            </a:r>
+            <a:endParaRPr lang="en-SG" sz="1050" b="1" dirty="0">
+              <a:solidFill>
+                <a:schemeClr val="accent3">
+                  <a:lumMod val="75000"/>
+                </a:schemeClr>
+              </a:solidFill>
+            </a:endParaRPr>
+          </a:p>
+        </p:txBody>
+      </p:sp>
+      <p:cxnSp>
+        <p:nvCxnSpPr>
+          <p:cNvPr id="58" name="Elbow Connector 57">
+            <a:extLst>
+              <a:ext uri="{FF2B5EF4-FFF2-40B4-BE49-F238E27FC236}">
+                <a16:creationId xmlns:a16="http://schemas.microsoft.com/office/drawing/2014/main" id="{579BBC52-55FD-7E42-B5FA-E124C2FD1058}"/>
+              </a:ext>
+            </a:extLst>
+          </p:cNvPr>
+          <p:cNvCxnSpPr>
+            <a:cxnSpLocks/>
+            <a:stCxn id="49" idx="2"/>
+            <a:endCxn id="57" idx="1"/>
+          </p:cNvCxnSpPr>
+          <p:nvPr/>
+        </p:nvCxnSpPr>
+        <p:spPr>
+          <a:xfrm rot="16200000" flipH="1">
+            <a:off x="3228462" y="3785615"/>
+            <a:ext cx="526014" cy="699176"/>
+          </a:xfrm>
+          <a:prstGeom prst="bentConnector2">
+            <a:avLst/>
+          </a:prstGeom>
+          <a:ln w="19050">
+            <a:solidFill>
+              <a:schemeClr val="accent3"/>
+            </a:solidFill>
+            <a:headEnd type="none" w="med" len="med"/>
+            <a:tailEnd type="arrow" w="med" len="med"/>
+          </a:ln>
+          <a:effectLst/>
+        </p:spPr>
+        <p:style>
+          <a:lnRef idx="1">
+            <a:schemeClr val="accent2"/>
+          </a:lnRef>
+          <a:fillRef idx="2">
+            <a:schemeClr val="accent2"/>
+          </a:fillRef>
+          <a:effectRef idx="1">
+            <a:schemeClr val="accent2"/>
+          </a:effectRef>
+          <a:fontRef idx="minor">
+            <a:schemeClr val="dk1"/>
+          </a:fontRef>
+        </p:style>
+      </p:cxnSp>
+      <p:cxnSp>
+        <p:nvCxnSpPr>
+          <p:cNvPr id="63" name="Elbow Connector 63">
+            <a:extLst>
+              <a:ext uri="{FF2B5EF4-FFF2-40B4-BE49-F238E27FC236}">
+                <a16:creationId xmlns:a16="http://schemas.microsoft.com/office/drawing/2014/main" id="{C22F5A4C-D8A6-A54C-85CF-B6B21D59BE44}"/>
+              </a:ext>
+            </a:extLst>
+          </p:cNvPr>
+          <p:cNvCxnSpPr>
+            <a:cxnSpLocks/>
+          </p:cNvCxnSpPr>
+          <p:nvPr/>
+        </p:nvCxnSpPr>
+        <p:spPr>
+          <a:xfrm rot="5400000">
+            <a:off x="4385380" y="3256953"/>
+            <a:ext cx="2061222" cy="226092"/>
+          </a:xfrm>
+          <a:prstGeom prst="bentConnector2">
+            <a:avLst/>
+          </a:prstGeom>
+          <a:ln w="6350">
+            <a:solidFill>
+              <a:schemeClr val="accent3"/>
+            </a:solidFill>
+            <a:headEnd type="none" w="med" len="med"/>
+            <a:tailEnd type="none" w="med" len="med"/>
+          </a:ln>
+          <a:effectLst/>
+        </p:spPr>
+        <p:style>
+          <a:lnRef idx="1">
+            <a:schemeClr val="accent2"/>
+          </a:lnRef>
+          <a:fillRef idx="2">
+            <a:schemeClr val="accent2"/>
+          </a:fillRef>
+          <a:effectRef idx="1">
+            <a:schemeClr val="accent2"/>
+          </a:effectRef>
+          <a:fontRef idx="minor">
+            <a:schemeClr val="dk1"/>
+          </a:fontRef>
+        </p:style>
+      </p:cxnSp>
+      <p:sp>
+        <p:nvSpPr>
+          <p:cNvPr id="64" name="Rectangle 11">
+            <a:extLst>
+              <a:ext uri="{FF2B5EF4-FFF2-40B4-BE49-F238E27FC236}">
+                <a16:creationId xmlns:a16="http://schemas.microsoft.com/office/drawing/2014/main" id="{4475F23F-1797-B449-8363-375C10A3A2A9}"/>
+              </a:ext>
+            </a:extLst>
+          </p:cNvPr>
+          <p:cNvSpPr/>
+          <p:nvPr/>
+        </p:nvSpPr>
+        <p:spPr>
+          <a:xfrm>
+            <a:off x="3842323" y="4580009"/>
+            <a:ext cx="1464555" cy="236841"/>
+          </a:xfrm>
+          <a:prstGeom prst="rect">
+            <a:avLst/>
+          </a:prstGeom>
+          <a:ln w="19050">
+            <a:solidFill>
+              <a:schemeClr val="accent3"/>
+            </a:solidFill>
+          </a:ln>
+          <a:effectLst/>
+        </p:spPr>
+        <p:style>
+          <a:lnRef idx="1">
+            <a:schemeClr val="accent3"/>
+          </a:lnRef>
+          <a:fillRef idx="2">
+            <a:schemeClr val="accent3"/>
+          </a:fillRef>
+          <a:effectRef idx="1">
+            <a:schemeClr val="accent3"/>
+          </a:effectRef>
+          <a:fontRef idx="minor">
+            <a:schemeClr val="dk1"/>
+          </a:fontRef>
+        </p:style>
+        <p:txBody>
+          <a:bodyPr rtlCol="0" anchor="ctr"/>
+          <a:lstStyle/>
+          <a:p>
+            <a:pPr algn="ctr"/>
+            <a:r>
+              <a:rPr lang="en-US" sz="1050" b="1" dirty="0" err="1">
+                <a:solidFill>
+                  <a:schemeClr val="accent3">
+                    <a:lumMod val="75000"/>
+                  </a:schemeClr>
+                </a:solidFill>
+              </a:rPr>
+              <a:t>CalendarContentCell</a:t>
+            </a:r>
+            <a:endParaRPr lang="en-SG" sz="1050" b="1" dirty="0">
+              <a:solidFill>
+                <a:schemeClr val="accent3">
+                  <a:lumMod val="75000"/>
+                </a:schemeClr>
+              </a:solidFill>
+            </a:endParaRPr>
+          </a:p>
+        </p:txBody>
+      </p:sp>
+      <p:cxnSp>
+        <p:nvCxnSpPr>
+          <p:cNvPr id="65" name="Elbow Connector 64">
+            <a:extLst>
+              <a:ext uri="{FF2B5EF4-FFF2-40B4-BE49-F238E27FC236}">
+                <a16:creationId xmlns:a16="http://schemas.microsoft.com/office/drawing/2014/main" id="{89611432-D98C-D946-A94F-D347EA9D78B1}"/>
+              </a:ext>
+            </a:extLst>
+          </p:cNvPr>
+          <p:cNvCxnSpPr>
+            <a:cxnSpLocks/>
+            <a:endCxn id="64" idx="1"/>
+          </p:cNvCxnSpPr>
+          <p:nvPr/>
+        </p:nvCxnSpPr>
+        <p:spPr>
+          <a:xfrm rot="16200000" flipH="1">
+            <a:off x="3229728" y="4085835"/>
+            <a:ext cx="526014" cy="699176"/>
+          </a:xfrm>
+          <a:prstGeom prst="bentConnector2">
+            <a:avLst/>
+          </a:prstGeom>
+          <a:ln w="19050">
+            <a:solidFill>
+              <a:schemeClr val="accent3"/>
+            </a:solidFill>
+            <a:headEnd type="none" w="med" len="med"/>
+            <a:tailEnd type="arrow" w="med" len="med"/>
+          </a:ln>
+          <a:effectLst/>
+        </p:spPr>
+        <p:style>
+          <a:lnRef idx="1">
+            <a:schemeClr val="accent2"/>
+          </a:lnRef>
+          <a:fillRef idx="2">
+            <a:schemeClr val="accent2"/>
+          </a:fillRef>
+          <a:effectRef idx="1">
+            <a:schemeClr val="accent2"/>
+          </a:effectRef>
+          <a:fontRef idx="minor">
+            <a:schemeClr val="dk1"/>
+          </a:fontRef>
+        </p:style>
+      </p:cxnSp>
+      <p:cxnSp>
+        <p:nvCxnSpPr>
+          <p:cNvPr id="66" name="Elbow Connector 63">
+            <a:extLst>
+              <a:ext uri="{FF2B5EF4-FFF2-40B4-BE49-F238E27FC236}">
+                <a16:creationId xmlns:a16="http://schemas.microsoft.com/office/drawing/2014/main" id="{78D8074B-6053-9D4A-9407-3C7E538B941C}"/>
+              </a:ext>
+            </a:extLst>
+          </p:cNvPr>
+          <p:cNvCxnSpPr>
+            <a:cxnSpLocks/>
+          </p:cNvCxnSpPr>
+          <p:nvPr/>
+        </p:nvCxnSpPr>
+        <p:spPr>
+          <a:xfrm rot="5400000">
+            <a:off x="4386646" y="3557173"/>
+            <a:ext cx="2061222" cy="226092"/>
+          </a:xfrm>
+          <a:prstGeom prst="bentConnector2">
+            <a:avLst/>
+          </a:prstGeom>
+          <a:ln w="6350">
+            <a:solidFill>
+              <a:schemeClr val="accent3"/>
+            </a:solidFill>
+            <a:headEnd type="none" w="med" len="med"/>
+            <a:tailEnd type="none" w="med" len="med"/>
+          </a:ln>
+          <a:effectLst/>
+        </p:spPr>
+        <p:style>
+          <a:lnRef idx="1">
+            <a:schemeClr val="accent2"/>
+          </a:lnRef>
+          <a:fillRef idx="2">
+            <a:schemeClr val="accent2"/>
+          </a:fillRef>
+          <a:effectRef idx="1">
+            <a:schemeClr val="accent2"/>
+          </a:effectRef>
+          <a:fontRef idx="minor">
+            <a:schemeClr val="dk1"/>
+          </a:fontRef>
+        </p:style>
+      </p:cxnSp>
+      <p:sp>
+        <p:nvSpPr>
+          <p:cNvPr id="69" name="Rectangle 11">
+            <a:extLst>
+              <a:ext uri="{FF2B5EF4-FFF2-40B4-BE49-F238E27FC236}">
+                <a16:creationId xmlns:a16="http://schemas.microsoft.com/office/drawing/2014/main" id="{98FD16FA-1941-5943-A985-018B4C49E7B2}"/>
+              </a:ext>
+            </a:extLst>
+          </p:cNvPr>
+          <p:cNvSpPr/>
+          <p:nvPr/>
+        </p:nvSpPr>
+        <p:spPr>
+          <a:xfrm>
+            <a:off x="2590791" y="4858730"/>
+            <a:ext cx="1093635" cy="236841"/>
+          </a:xfrm>
+          <a:prstGeom prst="rect">
+            <a:avLst/>
+          </a:prstGeom>
+          <a:ln w="19050">
+            <a:solidFill>
+              <a:schemeClr val="accent3"/>
+            </a:solidFill>
+          </a:ln>
+          <a:effectLst/>
+        </p:spPr>
+        <p:style>
+          <a:lnRef idx="1">
+            <a:schemeClr val="accent3"/>
+          </a:lnRef>
+          <a:fillRef idx="2">
+            <a:schemeClr val="accent3"/>
+          </a:fillRef>
+          <a:effectRef idx="1">
+            <a:schemeClr val="accent3"/>
+          </a:effectRef>
+          <a:fontRef idx="minor">
+            <a:schemeClr val="dk1"/>
+          </a:fontRef>
+        </p:style>
+        <p:txBody>
+          <a:bodyPr rtlCol="0" anchor="ctr"/>
+          <a:lstStyle/>
+          <a:p>
+            <a:pPr algn="ctr"/>
+            <a:r>
+              <a:rPr lang="en-US" sz="1050" b="1" dirty="0" err="1">
+                <a:solidFill>
+                  <a:schemeClr val="accent3">
+                    <a:lumMod val="75000"/>
+                  </a:schemeClr>
+                </a:solidFill>
+              </a:rPr>
+              <a:t>TaskListPanel</a:t>
+            </a:r>
+            <a:endParaRPr lang="en-SG" sz="1050" b="1" dirty="0">
+              <a:solidFill>
+                <a:schemeClr val="accent3">
+                  <a:lumMod val="75000"/>
+                </a:schemeClr>
+              </a:solidFill>
+            </a:endParaRPr>
+          </a:p>
+        </p:txBody>
+      </p:sp>
+      <p:sp>
+        <p:nvSpPr>
+          <p:cNvPr id="70" name="Rectangle 11">
+            <a:extLst>
+              <a:ext uri="{FF2B5EF4-FFF2-40B4-BE49-F238E27FC236}">
+                <a16:creationId xmlns:a16="http://schemas.microsoft.com/office/drawing/2014/main" id="{5FD3DD4A-6E14-DC4B-BDAF-AD8D973399B4}"/>
+              </a:ext>
+            </a:extLst>
+          </p:cNvPr>
+          <p:cNvSpPr/>
+          <p:nvPr/>
+        </p:nvSpPr>
+        <p:spPr>
+          <a:xfrm>
+            <a:off x="3837587" y="5095571"/>
+            <a:ext cx="1458015" cy="236841"/>
+          </a:xfrm>
+          <a:prstGeom prst="rect">
+            <a:avLst/>
+          </a:prstGeom>
+          <a:ln w="19050">
+            <a:solidFill>
+              <a:schemeClr val="accent3"/>
+            </a:solidFill>
+          </a:ln>
+          <a:effectLst/>
+        </p:spPr>
+        <p:style>
+          <a:lnRef idx="1">
+            <a:schemeClr val="accent3"/>
+          </a:lnRef>
+          <a:fillRef idx="2">
+            <a:schemeClr val="accent3"/>
+          </a:fillRef>
+          <a:effectRef idx="1">
+            <a:schemeClr val="accent3"/>
+          </a:effectRef>
+          <a:fontRef idx="minor">
+            <a:schemeClr val="dk1"/>
+          </a:fontRef>
+        </p:style>
+        <p:txBody>
+          <a:bodyPr rtlCol="0" anchor="ctr"/>
+          <a:lstStyle/>
+          <a:p>
+            <a:pPr algn="ctr"/>
+            <a:r>
+              <a:rPr lang="en-US" sz="1050" b="1" dirty="0" err="1">
+                <a:solidFill>
+                  <a:schemeClr val="accent3">
+                    <a:lumMod val="75000"/>
+                  </a:schemeClr>
+                </a:solidFill>
+              </a:rPr>
+              <a:t>TaskCard</a:t>
+            </a:r>
+            <a:endParaRPr lang="en-SG" sz="1050" b="1" dirty="0">
+              <a:solidFill>
+                <a:schemeClr val="accent3">
+                  <a:lumMod val="75000"/>
+                </a:schemeClr>
+              </a:solidFill>
+            </a:endParaRPr>
+          </a:p>
+        </p:txBody>
+      </p:sp>
+      <p:cxnSp>
+        <p:nvCxnSpPr>
+          <p:cNvPr id="71" name="Elbow Connector 63">
+            <a:extLst>
+              <a:ext uri="{FF2B5EF4-FFF2-40B4-BE49-F238E27FC236}">
+                <a16:creationId xmlns:a16="http://schemas.microsoft.com/office/drawing/2014/main" id="{B6913EBE-ED48-F14B-BCB4-617B213FC7D4}"/>
+              </a:ext>
+            </a:extLst>
+          </p:cNvPr>
+          <p:cNvCxnSpPr>
+            <a:cxnSpLocks/>
+            <a:endCxn id="70" idx="3"/>
+          </p:cNvCxnSpPr>
+          <p:nvPr/>
+        </p:nvCxnSpPr>
+        <p:spPr>
+          <a:xfrm rot="5400000">
+            <a:off x="4381307" y="4067065"/>
+            <a:ext cx="2061222" cy="232632"/>
+          </a:xfrm>
+          <a:prstGeom prst="bentConnector2">
+            <a:avLst/>
+          </a:prstGeom>
+          <a:ln w="6350">
+            <a:solidFill>
+              <a:schemeClr val="accent3"/>
+            </a:solidFill>
+            <a:headEnd type="none" w="med" len="med"/>
+            <a:tailEnd type="none" w="med" len="med"/>
+          </a:ln>
+          <a:effectLst/>
+        </p:spPr>
+        <p:style>
+          <a:lnRef idx="1">
+            <a:schemeClr val="accent2"/>
+          </a:lnRef>
+          <a:fillRef idx="2">
+            <a:schemeClr val="accent2"/>
+          </a:fillRef>
+          <a:effectRef idx="1">
+            <a:schemeClr val="accent2"/>
+          </a:effectRef>
+          <a:fontRef idx="minor">
+            <a:schemeClr val="dk1"/>
+          </a:fontRef>
+        </p:style>
+      </p:cxnSp>
+      <p:cxnSp>
+        <p:nvCxnSpPr>
+          <p:cNvPr id="72" name="Elbow Connector 71">
+            <a:extLst>
+              <a:ext uri="{FF2B5EF4-FFF2-40B4-BE49-F238E27FC236}">
+                <a16:creationId xmlns:a16="http://schemas.microsoft.com/office/drawing/2014/main" id="{D5D4D218-428D-F847-A4BF-5117CF2EC800}"/>
+              </a:ext>
+            </a:extLst>
+          </p:cNvPr>
+          <p:cNvCxnSpPr>
+            <a:cxnSpLocks/>
+            <a:stCxn id="69" idx="2"/>
+            <a:endCxn id="70" idx="1"/>
+          </p:cNvCxnSpPr>
+          <p:nvPr/>
+        </p:nvCxnSpPr>
+        <p:spPr>
+          <a:xfrm rot="16200000" flipH="1">
+            <a:off x="3428388" y="4804792"/>
+            <a:ext cx="118421" cy="699978"/>
+          </a:xfrm>
+          <a:prstGeom prst="bentConnector2">
+            <a:avLst/>
+          </a:prstGeom>
+          <a:ln w="19050">
+            <a:solidFill>
+              <a:schemeClr val="accent3"/>
+            </a:solidFill>
+            <a:headEnd type="none" w="med" len="med"/>
+            <a:tailEnd type="arrow" w="med" len="med"/>
+          </a:ln>
+          <a:effectLst/>
+        </p:spPr>
+        <p:style>
+          <a:lnRef idx="1">
+            <a:schemeClr val="accent2"/>
+          </a:lnRef>
+          <a:fillRef idx="2">
+            <a:schemeClr val="accent2"/>
+          </a:fillRef>
+          <a:effectRef idx="1">
+            <a:schemeClr val="accent2"/>
+          </a:effectRef>
+          <a:fontRef idx="minor">
+            <a:schemeClr val="dk1"/>
+          </a:fontRef>
+        </p:style>
+      </p:cxnSp>
+      <p:cxnSp>
+        <p:nvCxnSpPr>
+          <p:cNvPr id="75" name="Elbow Connector 63">
+            <a:extLst>
+              <a:ext uri="{FF2B5EF4-FFF2-40B4-BE49-F238E27FC236}">
+                <a16:creationId xmlns:a16="http://schemas.microsoft.com/office/drawing/2014/main" id="{FE8857BB-BE58-034A-BBDD-5D78626DAC81}"/>
+              </a:ext>
+            </a:extLst>
+          </p:cNvPr>
+          <p:cNvCxnSpPr>
+            <a:endCxn id="69" idx="3"/>
+          </p:cNvCxnSpPr>
+          <p:nvPr/>
+        </p:nvCxnSpPr>
+        <p:spPr>
+          <a:xfrm rot="5400000">
+            <a:off x="3694140" y="3143056"/>
+            <a:ext cx="1824381" cy="1843808"/>
+          </a:xfrm>
+          <a:prstGeom prst="bentConnector2">
+            <a:avLst/>
+          </a:prstGeom>
+          <a:ln w="6350">
+            <a:solidFill>
+              <a:schemeClr val="accent3"/>
+            </a:solidFill>
+            <a:headEnd type="none" w="med" len="med"/>
+            <a:tailEnd type="none" w="med" len="med"/>
+          </a:ln>
+          <a:effectLst/>
+        </p:spPr>
+        <p:style>
+          <a:lnRef idx="1">
+            <a:schemeClr val="accent2"/>
+          </a:lnRef>
+          <a:fillRef idx="2">
+            <a:schemeClr val="accent2"/>
+          </a:fillRef>
+          <a:effectRef idx="1">
+            <a:schemeClr val="accent2"/>
+          </a:effectRef>
+          <a:fontRef idx="minor">
+            <a:schemeClr val="dk1"/>
+          </a:fontRef>
+        </p:style>
+      </p:cxnSp>
+      <p:sp>
+        <p:nvSpPr>
+          <p:cNvPr id="76" name="Freeform 75">
+            <a:extLst>
+              <a:ext uri="{FF2B5EF4-FFF2-40B4-BE49-F238E27FC236}">
+                <a16:creationId xmlns:a16="http://schemas.microsoft.com/office/drawing/2014/main" id="{D8DB4A6B-46AB-334F-80CC-C77E22AF49D8}"/>
+              </a:ext>
+            </a:extLst>
+          </p:cNvPr>
+          <p:cNvSpPr/>
+          <p:nvPr/>
+        </p:nvSpPr>
+        <p:spPr>
+          <a:xfrm flipV="1">
+            <a:off x="4113064" y="5339478"/>
+            <a:ext cx="2642195" cy="101600"/>
+          </a:xfrm>
+          <a:custGeom>
+            <a:avLst/>
+            <a:gdLst>
+              <a:gd name="connsiteX0" fmla="*/ 0 w 3048000"/>
+              <a:gd name="connsiteY0" fmla="*/ 203200 h 203200"/>
+              <a:gd name="connsiteX1" fmla="*/ 221673 w 3048000"/>
+              <a:gd name="connsiteY1" fmla="*/ 0 h 203200"/>
+              <a:gd name="connsiteX2" fmla="*/ 3048000 w 3048000"/>
+              <a:gd name="connsiteY2" fmla="*/ 0 h 203200"/>
+            </a:gdLst>
+            <a:ahLst/>
+            <a:cxnLst>
+              <a:cxn ang="0">
+                <a:pos x="connsiteX0" y="connsiteY0"/>
+              </a:cxn>
+              <a:cxn ang="0">
+                <a:pos x="connsiteX1" y="connsiteY1"/>
+              </a:cxn>
+              <a:cxn ang="0">
+                <a:pos x="connsiteX2" y="connsiteY2"/>
+              </a:cxn>
+            </a:cxnLst>
+            <a:rect l="l" t="t" r="r" b="b"/>
+            <a:pathLst>
+              <a:path w="3048000" h="203200">
+                <a:moveTo>
+                  <a:pt x="0" y="203200"/>
+                </a:moveTo>
+                <a:lnTo>
+                  <a:pt x="221673" y="0"/>
+                </a:lnTo>
+                <a:lnTo>
+                  <a:pt x="3048000" y="0"/>
+                </a:lnTo>
+              </a:path>
+            </a:pathLst>
+          </a:custGeom>
+          <a:noFill/>
+          <a:ln w="19050">
+            <a:solidFill>
+              <a:schemeClr val="accent3"/>
+            </a:solidFill>
+            <a:prstDash val="sysDot"/>
+            <a:headEnd type="none" w="med" len="med"/>
+            <a:tailEnd type="arrow" w="med" len="med"/>
+          </a:ln>
+          <a:effectLst/>
+        </p:spPr>
+        <p:style>
+          <a:lnRef idx="1">
+            <a:schemeClr val="accent2"/>
+          </a:lnRef>
+          <a:fillRef idx="2">
+            <a:schemeClr val="accent2"/>
+          </a:fillRef>
+          <a:effectRef idx="1">
+            <a:schemeClr val="accent2"/>
+          </a:effectRef>
+          <a:fontRef idx="minor">
+            <a:schemeClr val="dk1"/>
+          </a:fontRef>
+        </p:style>
+        <p:txBody>
+          <a:bodyPr rtlCol="0" anchor="ctr"/>
+          <a:lstStyle/>
+          <a:p>
+            <a:pPr algn="ctr"/>
+            <a:endParaRPr lang="en-SG"/>
+          </a:p>
+        </p:txBody>
+      </p:sp>
+      <p:cxnSp>
+        <p:nvCxnSpPr>
+          <p:cNvPr id="78" name="Elbow Connector 63">
+            <a:extLst>
+              <a:ext uri="{FF2B5EF4-FFF2-40B4-BE49-F238E27FC236}">
+                <a16:creationId xmlns:a16="http://schemas.microsoft.com/office/drawing/2014/main" id="{DA049ED4-F36C-B649-ADB3-CE254FB64D6F}"/>
+              </a:ext>
+            </a:extLst>
+          </p:cNvPr>
+          <p:cNvCxnSpPr/>
+          <p:nvPr/>
+        </p:nvCxnSpPr>
+        <p:spPr>
+          <a:xfrm rot="16200000" flipH="1">
+            <a:off x="1881813" y="4229484"/>
+            <a:ext cx="1242356" cy="176400"/>
+          </a:xfrm>
+          <a:prstGeom prst="bentConnector2">
+            <a:avLst/>
+          </a:prstGeom>
+          <a:ln w="19050">
+            <a:solidFill>
+              <a:schemeClr val="accent3"/>
+            </a:solidFill>
+            <a:headEnd type="none" w="med" len="med"/>
+            <a:tailEnd type="arrow" w="med" len="med"/>
+          </a:ln>
+          <a:effectLst/>
+        </p:spPr>
+        <p:style>
+          <a:lnRef idx="1">
+            <a:schemeClr val="accent2"/>
+          </a:lnRef>
+          <a:fillRef idx="2">
+            <a:schemeClr val="accent2"/>
+          </a:fillRef>
+          <a:effectRef idx="1">
+            <a:schemeClr val="accent2"/>
+          </a:effectRef>
+          <a:fontRef idx="minor">
+            <a:schemeClr val="dk1"/>
+          </a:fontRef>
+        </p:style>
+      </p:cxnSp>
     </p:spTree>
     <p:extLst>
       <p:ext uri="{BB962C8B-B14F-4D97-AF65-F5344CB8AC3E}">

</xml_diff>